<commit_message>
Add diagrams showing approaches taken
</commit_message>
<xml_diff>
--- a/docs/Slides.pptx
+++ b/docs/Slides.pptx
@@ -6,9 +6,11 @@
   </p:sldMasterIdLst>
   <p:sldIdLst>
     <p:sldId id="256" r:id="rId2"/>
-    <p:sldId id="257" r:id="rId3"/>
-    <p:sldId id="258" r:id="rId4"/>
-    <p:sldId id="259" r:id="rId5"/>
+    <p:sldId id="261" r:id="rId3"/>
+    <p:sldId id="257" r:id="rId4"/>
+    <p:sldId id="258" r:id="rId5"/>
+    <p:sldId id="259" r:id="rId6"/>
+    <p:sldId id="260" r:id="rId7"/>
   </p:sldIdLst>
   <p:sldSz cx="12192000" cy="6858000"/>
   <p:notesSz cx="6858000" cy="9144000"/>
@@ -107,6 +109,11 @@
       </a:defRPr>
     </a:lvl9pPr>
   </p:defaultTextStyle>
+  <p:extLst>
+    <p:ext uri="{EFAFB233-063F-42B5-8137-9DF3F51BA10A}">
+      <p15:sldGuideLst xmlns:p15="http://schemas.microsoft.com/office/powerpoint/2012/main"/>
+    </p:ext>
+  </p:extLst>
 </p:presentation>
 </file>
 
@@ -2825,7 +2832,7 @@
         <a:p>
           <a:r>
             <a:rPr lang="en-US" sz="2800" dirty="0"/>
-            <a:t>Create a mask of the image</a:t>
+            <a:t>Create a 2 masks of the image (strict and broad)</a:t>
           </a:r>
         </a:p>
       </dgm:t>
@@ -2897,8 +2904,13 @@
         <a:p>
           <a:r>
             <a:rPr lang="en-US" sz="2800" dirty="0"/>
-            <a:t>Manual intervention</a:t>
+            <a:t>Calculate the </a:t>
           </a:r>
+          <a:r>
+            <a:rPr lang="en-US" sz="2800" dirty="0" err="1"/>
+            <a:t>trimap</a:t>
+          </a:r>
+          <a:endParaRPr lang="en-US" sz="2800" dirty="0"/>
         </a:p>
       </dgm:t>
     </dgm:pt>
@@ -2933,15 +2945,7 @@
         <a:p>
           <a:r>
             <a:rPr lang="en-US" dirty="0"/>
-            <a:t>Drawing the </a:t>
-          </a:r>
-          <a:r>
-            <a:rPr lang="en-US" dirty="0" err="1"/>
-            <a:t>trimap</a:t>
-          </a:r>
-          <a:r>
-            <a:rPr lang="en-US" dirty="0"/>
-            <a:t> on the image</a:t>
+            <a:t>Using the intersection of the 2 masks found before</a:t>
           </a:r>
         </a:p>
       </dgm:t>
@@ -3357,7 +3361,7 @@
         <a:p>
           <a:r>
             <a:rPr lang="en-US" sz="2800" dirty="0"/>
-            <a:t>Create a mask of the image</a:t>
+            <a:t>Create a 2 masks of the image (broad and strict)</a:t>
           </a:r>
         </a:p>
       </dgm:t>
@@ -3429,8 +3433,13 @@
         <a:p>
           <a:r>
             <a:rPr lang="en-US" sz="2800" dirty="0"/>
-            <a:t>Manual intervention</a:t>
+            <a:t>Calculate the </a:t>
           </a:r>
+          <a:r>
+            <a:rPr lang="en-US" sz="2800" dirty="0" err="1"/>
+            <a:t>trimap</a:t>
+          </a:r>
+          <a:endParaRPr lang="en-US" sz="2800" dirty="0"/>
         </a:p>
       </dgm:t>
     </dgm:pt>
@@ -3465,15 +3474,7 @@
         <a:p>
           <a:r>
             <a:rPr lang="en-US" dirty="0"/>
-            <a:t>Drawing the </a:t>
-          </a:r>
-          <a:r>
-            <a:rPr lang="en-US" dirty="0" err="1"/>
-            <a:t>trimap</a:t>
-          </a:r>
-          <a:r>
-            <a:rPr lang="en-US" dirty="0"/>
-            <a:t> on the image</a:t>
+            <a:t>Using the intersection of the 2 masks found before</a:t>
           </a:r>
         </a:p>
       </dgm:t>
@@ -3788,7 +3789,7 @@
   <dgm:whole/>
   <dgm:extLst>
     <a:ext uri="http://schemas.microsoft.com/office/drawing/2008/diagram">
-      <dsp:dataModelExt xmlns:dsp="http://schemas.microsoft.com/office/drawing/2008/diagram" relId="rId6" minVer="http://schemas.openxmlformats.org/drawingml/2006/diagram"/>
+      <dsp:dataModelExt xmlns:dsp="http://schemas.microsoft.com/office/drawing/2008/diagram" relId="rId8" minVer="http://schemas.openxmlformats.org/drawingml/2006/diagram"/>
     </a:ext>
   </dgm:extLst>
 </dgm:dataModel>
@@ -4564,8 +4565,13 @@
           </a:pPr>
           <a:r>
             <a:rPr lang="en-US" sz="2800" kern="1200" dirty="0"/>
-            <a:t>Manual intervention</a:t>
+            <a:t>Calculate the </a:t>
           </a:r>
+          <a:r>
+            <a:rPr lang="en-US" sz="2800" kern="1200" dirty="0" err="1"/>
+            <a:t>trimap</a:t>
+          </a:r>
+          <a:endParaRPr lang="en-US" sz="2800" kern="1200" dirty="0"/>
         </a:p>
       </dsp:txBody>
       <dsp:txXfrm rot="-10800000">
@@ -4644,15 +4650,7 @@
           </a:pPr>
           <a:r>
             <a:rPr lang="en-US" sz="2700" kern="1200" dirty="0"/>
-            <a:t>Drawing the </a:t>
-          </a:r>
-          <a:r>
-            <a:rPr lang="en-US" sz="2700" kern="1200" dirty="0" err="1"/>
-            <a:t>trimap</a:t>
-          </a:r>
-          <a:r>
-            <a:rPr lang="en-US" sz="2700" kern="1200" dirty="0"/>
-            <a:t> on the image</a:t>
+            <a:t>Using the intersection of the 2 masks found before</a:t>
           </a:r>
         </a:p>
       </dsp:txBody>
@@ -4730,7 +4728,7 @@
           </a:pPr>
           <a:r>
             <a:rPr lang="en-US" sz="2800" kern="1200" dirty="0"/>
-            <a:t>Create a mask of the image</a:t>
+            <a:t>Create a 2 masks of the image (strict and broad)</a:t>
           </a:r>
         </a:p>
       </dsp:txBody>
@@ -5076,8 +5074,8 @@
       </dsp:nvSpPr>
       <dsp:spPr>
         <a:xfrm>
-          <a:off x="0" y="4578944"/>
-          <a:ext cx="8560473" cy="1001761"/>
+          <a:off x="0" y="4455260"/>
+          <a:ext cx="8885141" cy="974702"/>
         </a:xfrm>
         <a:prstGeom prst="rect">
           <a:avLst/>
@@ -5143,8 +5141,8 @@
         </a:p>
       </dsp:txBody>
       <dsp:txXfrm>
-        <a:off x="0" y="4578944"/>
-        <a:ext cx="8560473" cy="540950"/>
+        <a:off x="0" y="4455260"/>
+        <a:ext cx="8885141" cy="526339"/>
       </dsp:txXfrm>
     </dsp:sp>
     <dsp:sp modelId="{0C795153-F4C2-4B2C-92B0-234277C858B1}">
@@ -5154,8 +5152,8 @@
       </dsp:nvSpPr>
       <dsp:spPr>
         <a:xfrm>
-          <a:off x="0" y="5099859"/>
-          <a:ext cx="8560473" cy="460810"/>
+          <a:off x="0" y="4962105"/>
+          <a:ext cx="8885141" cy="448362"/>
         </a:xfrm>
         <a:prstGeom prst="rect">
           <a:avLst/>
@@ -5223,8 +5221,8 @@
         </a:p>
       </dsp:txBody>
       <dsp:txXfrm>
-        <a:off x="0" y="5099859"/>
-        <a:ext cx="8560473" cy="460810"/>
+        <a:off x="0" y="4962105"/>
+        <a:ext cx="8885141" cy="448362"/>
       </dsp:txXfrm>
     </dsp:sp>
     <dsp:sp modelId="{008FAAB3-1509-4720-815E-212944228CAF}">
@@ -5234,8 +5232,8 @@
       </dsp:nvSpPr>
       <dsp:spPr>
         <a:xfrm rot="10800000">
-          <a:off x="0" y="3053262"/>
-          <a:ext cx="8560473" cy="1540708"/>
+          <a:off x="0" y="2970789"/>
+          <a:ext cx="8885141" cy="1499091"/>
         </a:xfrm>
         <a:prstGeom prst="upArrowCallout">
           <a:avLst/>
@@ -5296,13 +5294,18 @@
           </a:pPr>
           <a:r>
             <a:rPr lang="en-US" sz="2800" kern="1200" dirty="0"/>
-            <a:t>Manual intervention</a:t>
+            <a:t>Calculate the </a:t>
           </a:r>
+          <a:r>
+            <a:rPr lang="en-US" sz="2800" kern="1200" dirty="0" err="1"/>
+            <a:t>trimap</a:t>
+          </a:r>
+          <a:endParaRPr lang="en-US" sz="2800" kern="1200" dirty="0"/>
         </a:p>
       </dsp:txBody>
       <dsp:txXfrm rot="-10800000">
-        <a:off x="0" y="3053262"/>
-        <a:ext cx="8560473" cy="540788"/>
+        <a:off x="0" y="2970789"/>
+        <a:ext cx="8885141" cy="526181"/>
       </dsp:txXfrm>
     </dsp:sp>
     <dsp:sp modelId="{4E46A0B2-0137-481C-B99D-1BBFDACCD29D}">
@@ -5312,8 +5315,8 @@
       </dsp:nvSpPr>
       <dsp:spPr>
         <a:xfrm>
-          <a:off x="0" y="3594050"/>
-          <a:ext cx="8560473" cy="460671"/>
+          <a:off x="0" y="3496970"/>
+          <a:ext cx="8885141" cy="448228"/>
         </a:xfrm>
         <a:prstGeom prst="rect">
           <a:avLst/>
@@ -5376,21 +5379,13 @@
           </a:pPr>
           <a:r>
             <a:rPr lang="en-US" sz="2300" kern="1200" dirty="0"/>
-            <a:t>Drawing the </a:t>
-          </a:r>
-          <a:r>
-            <a:rPr lang="en-US" sz="2300" kern="1200" dirty="0" err="1"/>
-            <a:t>trimap</a:t>
-          </a:r>
-          <a:r>
-            <a:rPr lang="en-US" sz="2300" kern="1200" dirty="0"/>
-            <a:t> on the image</a:t>
+            <a:t>Using the intersection of the 2 masks found before</a:t>
           </a:r>
         </a:p>
       </dsp:txBody>
       <dsp:txXfrm>
-        <a:off x="0" y="3594050"/>
-        <a:ext cx="8560473" cy="460671"/>
+        <a:off x="0" y="3496970"/>
+        <a:ext cx="8885141" cy="448228"/>
       </dsp:txXfrm>
     </dsp:sp>
     <dsp:sp modelId="{AFBA27A0-CC92-4683-8383-CB898D86E27D}">
@@ -5400,8 +5395,8 @@
       </dsp:nvSpPr>
       <dsp:spPr>
         <a:xfrm rot="10800000">
-          <a:off x="0" y="1527579"/>
-          <a:ext cx="8560473" cy="1540708"/>
+          <a:off x="0" y="1486317"/>
+          <a:ext cx="8885141" cy="1499091"/>
         </a:xfrm>
         <a:prstGeom prst="upArrowCallout">
           <a:avLst/>
@@ -5462,13 +5457,13 @@
           </a:pPr>
           <a:r>
             <a:rPr lang="en-US" sz="2800" kern="1200" dirty="0"/>
-            <a:t>Create a mask of the image</a:t>
+            <a:t>Create a 2 masks of the image (broad and strict)</a:t>
           </a:r>
         </a:p>
       </dsp:txBody>
       <dsp:txXfrm rot="-10800000">
-        <a:off x="0" y="1527579"/>
-        <a:ext cx="8560473" cy="540788"/>
+        <a:off x="0" y="1486317"/>
+        <a:ext cx="8885141" cy="526181"/>
       </dsp:txXfrm>
     </dsp:sp>
     <dsp:sp modelId="{1540959E-A89B-4F46-8D0D-0CD0B0DE3990}">
@@ -5478,8 +5473,8 @@
       </dsp:nvSpPr>
       <dsp:spPr>
         <a:xfrm>
-          <a:off x="0" y="2068368"/>
-          <a:ext cx="8560473" cy="460671"/>
+          <a:off x="0" y="2012499"/>
+          <a:ext cx="8885141" cy="448228"/>
         </a:xfrm>
         <a:prstGeom prst="rect">
           <a:avLst/>
@@ -5547,8 +5542,8 @@
         </a:p>
       </dsp:txBody>
       <dsp:txXfrm>
-        <a:off x="0" y="2068368"/>
-        <a:ext cx="8560473" cy="460671"/>
+        <a:off x="0" y="2012499"/>
+        <a:ext cx="8885141" cy="448228"/>
       </dsp:txXfrm>
     </dsp:sp>
     <dsp:sp modelId="{9E4B1F79-9072-4DE3-83FB-B600AA5DD434}">
@@ -5558,8 +5553,8 @@
       </dsp:nvSpPr>
       <dsp:spPr>
         <a:xfrm rot="10800000">
-          <a:off x="0" y="1897"/>
-          <a:ext cx="8560473" cy="1540708"/>
+          <a:off x="0" y="1846"/>
+          <a:ext cx="8885141" cy="1499091"/>
         </a:xfrm>
         <a:prstGeom prst="upArrowCallout">
           <a:avLst/>
@@ -5625,8 +5620,8 @@
         </a:p>
       </dsp:txBody>
       <dsp:txXfrm rot="-10800000">
-        <a:off x="0" y="1897"/>
-        <a:ext cx="8560473" cy="540788"/>
+        <a:off x="0" y="1846"/>
+        <a:ext cx="8885141" cy="526181"/>
       </dsp:txXfrm>
     </dsp:sp>
     <dsp:sp modelId="{9E0C10A1-F572-4428-8C09-BE8C095D6D40}">
@@ -5636,8 +5631,8 @@
       </dsp:nvSpPr>
       <dsp:spPr>
         <a:xfrm>
-          <a:off x="0" y="542686"/>
-          <a:ext cx="4280236" cy="460671"/>
+          <a:off x="0" y="528027"/>
+          <a:ext cx="4442570" cy="448228"/>
         </a:xfrm>
         <a:prstGeom prst="rect">
           <a:avLst/>
@@ -5705,8 +5700,8 @@
         </a:p>
       </dsp:txBody>
       <dsp:txXfrm>
-        <a:off x="0" y="542686"/>
-        <a:ext cx="4280236" cy="460671"/>
+        <a:off x="0" y="528027"/>
+        <a:ext cx="4442570" cy="448228"/>
       </dsp:txXfrm>
     </dsp:sp>
     <dsp:sp modelId="{3A5BC107-FDD5-4B03-B893-E6C6B78C4848}">
@@ -5716,8 +5711,8 @@
       </dsp:nvSpPr>
       <dsp:spPr>
         <a:xfrm>
-          <a:off x="4280236" y="542686"/>
-          <a:ext cx="4280236" cy="460671"/>
+          <a:off x="4442570" y="528027"/>
+          <a:ext cx="4442570" cy="448228"/>
         </a:xfrm>
         <a:prstGeom prst="rect">
           <a:avLst/>
@@ -5785,8 +5780,8 @@
         </a:p>
       </dsp:txBody>
       <dsp:txXfrm>
-        <a:off x="4280236" y="542686"/>
-        <a:ext cx="4280236" cy="460671"/>
+        <a:off x="4442570" y="528027"/>
+        <a:ext cx="4442570" cy="448228"/>
       </dsp:txXfrm>
     </dsp:sp>
   </dsp:spTree>
@@ -10836,7 +10831,7 @@
           <a:p>
             <a:fld id="{5045F6C5-F478-4FAF-B88B-617EBED77F14}" type="datetimeFigureOut">
               <a:rPr lang="en-US" smtClean="0"/>
-              <a:t>2/4/2024</a:t>
+              <a:t>2/5/2024</a:t>
             </a:fld>
             <a:endParaRPr lang="en-US"/>
           </a:p>
@@ -11034,7 +11029,7 @@
           <a:p>
             <a:fld id="{5045F6C5-F478-4FAF-B88B-617EBED77F14}" type="datetimeFigureOut">
               <a:rPr lang="en-US" smtClean="0"/>
-              <a:t>2/4/2024</a:t>
+              <a:t>2/5/2024</a:t>
             </a:fld>
             <a:endParaRPr lang="en-US"/>
           </a:p>
@@ -11242,7 +11237,7 @@
           <a:p>
             <a:fld id="{5045F6C5-F478-4FAF-B88B-617EBED77F14}" type="datetimeFigureOut">
               <a:rPr lang="en-US" smtClean="0"/>
-              <a:t>2/4/2024</a:t>
+              <a:t>2/5/2024</a:t>
             </a:fld>
             <a:endParaRPr lang="en-US"/>
           </a:p>
@@ -11440,7 +11435,7 @@
           <a:p>
             <a:fld id="{5045F6C5-F478-4FAF-B88B-617EBED77F14}" type="datetimeFigureOut">
               <a:rPr lang="en-US" smtClean="0"/>
-              <a:t>2/4/2024</a:t>
+              <a:t>2/5/2024</a:t>
             </a:fld>
             <a:endParaRPr lang="en-US"/>
           </a:p>
@@ -11715,7 +11710,7 @@
           <a:p>
             <a:fld id="{5045F6C5-F478-4FAF-B88B-617EBED77F14}" type="datetimeFigureOut">
               <a:rPr lang="en-US" smtClean="0"/>
-              <a:t>2/4/2024</a:t>
+              <a:t>2/5/2024</a:t>
             </a:fld>
             <a:endParaRPr lang="en-US"/>
           </a:p>
@@ -11980,7 +11975,7 @@
           <a:p>
             <a:fld id="{5045F6C5-F478-4FAF-B88B-617EBED77F14}" type="datetimeFigureOut">
               <a:rPr lang="en-US" smtClean="0"/>
-              <a:t>2/4/2024</a:t>
+              <a:t>2/5/2024</a:t>
             </a:fld>
             <a:endParaRPr lang="en-US"/>
           </a:p>
@@ -12392,7 +12387,7 @@
           <a:p>
             <a:fld id="{5045F6C5-F478-4FAF-B88B-617EBED77F14}" type="datetimeFigureOut">
               <a:rPr lang="en-US" smtClean="0"/>
-              <a:t>2/4/2024</a:t>
+              <a:t>2/5/2024</a:t>
             </a:fld>
             <a:endParaRPr lang="en-US"/>
           </a:p>
@@ -12533,7 +12528,7 @@
           <a:p>
             <a:fld id="{5045F6C5-F478-4FAF-B88B-617EBED77F14}" type="datetimeFigureOut">
               <a:rPr lang="en-US" smtClean="0"/>
-              <a:t>2/4/2024</a:t>
+              <a:t>2/5/2024</a:t>
             </a:fld>
             <a:endParaRPr lang="en-US"/>
           </a:p>
@@ -12646,7 +12641,7 @@
           <a:p>
             <a:fld id="{5045F6C5-F478-4FAF-B88B-617EBED77F14}" type="datetimeFigureOut">
               <a:rPr lang="en-US" smtClean="0"/>
-              <a:t>2/4/2024</a:t>
+              <a:t>2/5/2024</a:t>
             </a:fld>
             <a:endParaRPr lang="en-US"/>
           </a:p>
@@ -12957,7 +12952,7 @@
           <a:p>
             <a:fld id="{5045F6C5-F478-4FAF-B88B-617EBED77F14}" type="datetimeFigureOut">
               <a:rPr lang="en-US" smtClean="0"/>
-              <a:t>2/4/2024</a:t>
+              <a:t>2/5/2024</a:t>
             </a:fld>
             <a:endParaRPr lang="en-US"/>
           </a:p>
@@ -13245,7 +13240,7 @@
           <a:p>
             <a:fld id="{5045F6C5-F478-4FAF-B88B-617EBED77F14}" type="datetimeFigureOut">
               <a:rPr lang="en-US" smtClean="0"/>
-              <a:t>2/4/2024</a:t>
+              <a:t>2/5/2024</a:t>
             </a:fld>
             <a:endParaRPr lang="en-US"/>
           </a:p>
@@ -13486,7 +13481,7 @@
           <a:p>
             <a:fld id="{5045F6C5-F478-4FAF-B88B-617EBED77F14}" type="datetimeFigureOut">
               <a:rPr lang="en-US" smtClean="0"/>
-              <a:t>2/4/2024</a:t>
+              <a:t>2/5/2024</a:t>
             </a:fld>
             <a:endParaRPr lang="en-US"/>
           </a:p>
@@ -13889,6 +13884,265 @@
 <file path=ppt/slides/slide1.xml><?xml version="1.0" encoding="utf-8"?>
 <p:sld xmlns:a="http://schemas.openxmlformats.org/drawingml/2006/main" xmlns:r="http://schemas.openxmlformats.org/officeDocument/2006/relationships" xmlns:p="http://schemas.openxmlformats.org/presentationml/2006/main">
   <p:cSld>
+    <p:bg>
+      <p:bgPr>
+        <a:solidFill>
+          <a:srgbClr val="000000"/>
+        </a:solidFill>
+        <a:effectLst/>
+      </p:bgPr>
+    </p:bg>
+    <p:spTree>
+      <p:nvGrpSpPr>
+        <p:cNvPr id="1" name=""/>
+        <p:cNvGrpSpPr/>
+        <p:nvPr/>
+      </p:nvGrpSpPr>
+      <p:grpSpPr>
+        <a:xfrm>
+          <a:off x="0" y="0"/>
+          <a:ext cx="0" cy="0"/>
+          <a:chOff x="0" y="0"/>
+          <a:chExt cx="0" cy="0"/>
+        </a:xfrm>
+      </p:grpSpPr>
+      <p:sp>
+        <p:nvSpPr>
+          <p:cNvPr id="23" name="Rectangle 22">
+            <a:extLst>
+              <a:ext uri="{FF2B5EF4-FFF2-40B4-BE49-F238E27FC236}">
+                <a16:creationId xmlns:a16="http://schemas.microsoft.com/office/drawing/2014/main" id="{71B2258F-86CA-4D4D-8270-BC05FCDEBFB3}"/>
+              </a:ext>
+              <a:ext uri="{C183D7F6-B498-43B3-948B-1728B52AA6E4}">
+                <adec:decorative xmlns:adec="http://schemas.microsoft.com/office/drawing/2017/decorative" val="1"/>
+              </a:ext>
+            </a:extLst>
+          </p:cNvPr>
+          <p:cNvSpPr>
+            <a:spLocks noGrp="1" noRot="1" noChangeAspect="1" noMove="1" noResize="1" noEditPoints="1" noAdjustHandles="1" noChangeArrowheads="1" noChangeShapeType="1" noTextEdit="1"/>
+          </p:cNvSpPr>
+          <p:nvPr>
+            <p:extLst>
+              <p:ext uri="{386F3935-93C4-4BCD-93E2-E3B085C9AB24}">
+                <p16:designElem xmlns:p16="http://schemas.microsoft.com/office/powerpoint/2015/main" val="1"/>
+              </p:ext>
+            </p:extLst>
+          </p:nvPr>
+        </p:nvSpPr>
+        <p:spPr>
+          <a:xfrm>
+            <a:off x="0" y="0"/>
+            <a:ext cx="12192000" cy="6857999"/>
+          </a:xfrm>
+          <a:prstGeom prst="rect">
+            <a:avLst/>
+          </a:prstGeom>
+          <a:solidFill>
+            <a:srgbClr val="000000"/>
+          </a:solidFill>
+          <a:ln>
+            <a:noFill/>
+          </a:ln>
+        </p:spPr>
+        <p:style>
+          <a:lnRef idx="2">
+            <a:schemeClr val="accent1">
+              <a:shade val="50000"/>
+            </a:schemeClr>
+          </a:lnRef>
+          <a:fillRef idx="1">
+            <a:schemeClr val="accent1"/>
+          </a:fillRef>
+          <a:effectRef idx="0">
+            <a:schemeClr val="accent1"/>
+          </a:effectRef>
+          <a:fontRef idx="minor">
+            <a:schemeClr val="lt1"/>
+          </a:fontRef>
+        </p:style>
+        <p:txBody>
+          <a:bodyPr rtlCol="0" anchor="ctr"/>
+          <a:lstStyle/>
+          <a:p>
+            <a:pPr algn="ctr"/>
+            <a:endParaRPr lang="en-US"/>
+          </a:p>
+        </p:txBody>
+      </p:sp>
+      <p:pic>
+        <p:nvPicPr>
+          <p:cNvPr id="12" name="Picture 11" descr="Abstract light trails against black background">
+            <a:extLst>
+              <a:ext uri="{FF2B5EF4-FFF2-40B4-BE49-F238E27FC236}">
+                <a16:creationId xmlns:a16="http://schemas.microsoft.com/office/drawing/2014/main" id="{B42424C0-F0C0-45EA-CEEB-7628134493C2}"/>
+              </a:ext>
+            </a:extLst>
+          </p:cNvPr>
+          <p:cNvPicPr>
+            <a:picLocks noChangeAspect="1"/>
+          </p:cNvPicPr>
+          <p:nvPr/>
+        </p:nvPicPr>
+        <p:blipFill rotWithShape="1">
+          <a:blip r:embed="rId2">
+            <a:alphaModFix amt="50000"/>
+          </a:blip>
+          <a:srcRect t="7994" b="7736"/>
+          <a:stretch/>
+        </p:blipFill>
+        <p:spPr>
+          <a:xfrm>
+            <a:off x="20" y="1"/>
+            <a:ext cx="12191980" cy="6857999"/>
+          </a:xfrm>
+          <a:prstGeom prst="rect">
+            <a:avLst/>
+          </a:prstGeom>
+        </p:spPr>
+      </p:pic>
+      <p:sp>
+        <p:nvSpPr>
+          <p:cNvPr id="2" name="Title 1">
+            <a:extLst>
+              <a:ext uri="{FF2B5EF4-FFF2-40B4-BE49-F238E27FC236}">
+                <a16:creationId xmlns:a16="http://schemas.microsoft.com/office/drawing/2014/main" id="{225D8375-FFD6-FBA8-D599-17CD8A705CCD}"/>
+              </a:ext>
+            </a:extLst>
+          </p:cNvPr>
+          <p:cNvSpPr>
+            <a:spLocks noGrp="1"/>
+          </p:cNvSpPr>
+          <p:nvPr>
+            <p:ph type="ctrTitle"/>
+          </p:nvPr>
+        </p:nvSpPr>
+        <p:spPr>
+          <a:xfrm>
+            <a:off x="1524000" y="528481"/>
+            <a:ext cx="9144000" cy="2900518"/>
+          </a:xfrm>
+        </p:spPr>
+        <p:txBody>
+          <a:bodyPr>
+            <a:normAutofit/>
+          </a:bodyPr>
+          <a:lstStyle/>
+          <a:p>
+            <a:r>
+              <a:rPr lang="en-US" dirty="0">
+                <a:solidFill>
+                  <a:srgbClr val="FFFFFF"/>
+                </a:solidFill>
+              </a:rPr>
+              <a:t>Object contours detection in motion-blurred image</a:t>
+            </a:r>
+          </a:p>
+        </p:txBody>
+      </p:sp>
+      <p:sp>
+        <p:nvSpPr>
+          <p:cNvPr id="3" name="Subtitle 2">
+            <a:extLst>
+              <a:ext uri="{FF2B5EF4-FFF2-40B4-BE49-F238E27FC236}">
+                <a16:creationId xmlns:a16="http://schemas.microsoft.com/office/drawing/2014/main" id="{462ECB80-665A-3D46-15B9-2E60BD0E7C51}"/>
+              </a:ext>
+            </a:extLst>
+          </p:cNvPr>
+          <p:cNvSpPr>
+            <a:spLocks noGrp="1"/>
+          </p:cNvSpPr>
+          <p:nvPr>
+            <p:ph type="subTitle" idx="1"/>
+          </p:nvPr>
+        </p:nvSpPr>
+        <p:spPr>
+          <a:xfrm>
+            <a:off x="1524000" y="4882735"/>
+            <a:ext cx="9144000" cy="1763724"/>
+          </a:xfrm>
+        </p:spPr>
+        <p:txBody>
+          <a:bodyPr>
+            <a:normAutofit/>
+          </a:bodyPr>
+          <a:lstStyle/>
+          <a:p>
+            <a:r>
+              <a:rPr lang="en-US" dirty="0">
+                <a:solidFill>
+                  <a:srgbClr val="FFFFFF"/>
+                </a:solidFill>
+              </a:rPr>
+              <a:t>Presented by:</a:t>
+            </a:r>
+          </a:p>
+          <a:p>
+            <a:r>
+              <a:rPr lang="en-US" dirty="0">
+                <a:solidFill>
+                  <a:srgbClr val="FFFFFF"/>
+                </a:solidFill>
+              </a:rPr>
+              <a:t>Angela Remolina and </a:t>
+            </a:r>
+            <a:r>
+              <a:rPr lang="en-US" dirty="0" err="1">
+                <a:solidFill>
+                  <a:srgbClr val="FFFFFF"/>
+                </a:solidFill>
+              </a:rPr>
+              <a:t>Semjon</a:t>
+            </a:r>
+            <a:r>
+              <a:rPr lang="en-US" dirty="0">
+                <a:solidFill>
+                  <a:srgbClr val="FFFFFF"/>
+                </a:solidFill>
+              </a:rPr>
+              <a:t> </a:t>
+            </a:r>
+            <a:r>
+              <a:rPr lang="en-US" dirty="0" err="1">
+                <a:solidFill>
+                  <a:srgbClr val="FFFFFF"/>
+                </a:solidFill>
+              </a:rPr>
+              <a:t>Tukmatsov</a:t>
+            </a:r>
+            <a:endParaRPr lang="en-US" dirty="0">
+              <a:solidFill>
+                <a:srgbClr val="FFFFFF"/>
+              </a:solidFill>
+            </a:endParaRPr>
+          </a:p>
+          <a:p>
+            <a:r>
+              <a:rPr lang="en-US" b="1" dirty="0">
+                <a:solidFill>
+                  <a:srgbClr val="FFFFFF"/>
+                </a:solidFill>
+              </a:rPr>
+              <a:t>IACV project 2023-2024</a:t>
+            </a:r>
+          </a:p>
+        </p:txBody>
+      </p:sp>
+    </p:spTree>
+    <p:extLst>
+      <p:ext uri="{BB962C8B-B14F-4D97-AF65-F5344CB8AC3E}">
+        <p14:creationId xmlns:p14="http://schemas.microsoft.com/office/powerpoint/2010/main" val="825206913"/>
+      </p:ext>
+    </p:extLst>
+  </p:cSld>
+  <p:clrMapOvr>
+    <a:overrideClrMapping bg1="dk1" tx1="lt1" bg2="dk2" tx2="lt2" accent1="accent1" accent2="accent2" accent3="accent3" accent4="accent4" accent5="accent5" accent6="accent6" hlink="hlink" folHlink="folHlink"/>
+  </p:clrMapOvr>
+</p:sld>
+</file>
+
+<file path=ppt/slides/slide2.xml><?xml version="1.0" encoding="utf-8"?>
+<p:sld xmlns:a="http://schemas.openxmlformats.org/drawingml/2006/main" xmlns:r="http://schemas.openxmlformats.org/officeDocument/2006/relationships" xmlns:p="http://schemas.openxmlformats.org/presentationml/2006/main">
+  <p:cSld>
     <p:spTree>
       <p:nvGrpSpPr>
         <p:cNvPr id="1" name=""/>
@@ -13908,7 +14162,7 @@
           <p:cNvPr id="2" name="Title 1">
             <a:extLst>
               <a:ext uri="{FF2B5EF4-FFF2-40B4-BE49-F238E27FC236}">
-                <a16:creationId xmlns:a16="http://schemas.microsoft.com/office/drawing/2014/main" id="{225D8375-FFD6-FBA8-D599-17CD8A705CCD}"/>
+                <a16:creationId xmlns:a16="http://schemas.microsoft.com/office/drawing/2014/main" id="{C2D0390C-8F88-8256-40FE-5E91E2737717}"/>
               </a:ext>
             </a:extLst>
           </p:cNvPr>
@@ -13916,7 +14170,7 @@
             <a:spLocks noGrp="1"/>
           </p:cNvSpPr>
           <p:nvPr>
-            <p:ph type="ctrTitle"/>
+            <p:ph type="title"/>
           </p:nvPr>
         </p:nvSpPr>
         <p:spPr/>
@@ -13924,16 +14178,19 @@
           <a:bodyPr/>
           <a:lstStyle/>
           <a:p>
-            <a:endParaRPr lang="en-US"/>
+            <a:r>
+              <a:rPr lang="en-US" dirty="0"/>
+              <a:t>Agenda</a:t>
+            </a:r>
           </a:p>
         </p:txBody>
       </p:sp>
       <p:sp>
         <p:nvSpPr>
-          <p:cNvPr id="3" name="Subtitle 2">
+          <p:cNvPr id="3" name="Content Placeholder 2">
             <a:extLst>
               <a:ext uri="{FF2B5EF4-FFF2-40B4-BE49-F238E27FC236}">
-                <a16:creationId xmlns:a16="http://schemas.microsoft.com/office/drawing/2014/main" id="{462ECB80-665A-3D46-15B9-2E60BD0E7C51}"/>
+                <a16:creationId xmlns:a16="http://schemas.microsoft.com/office/drawing/2014/main" id="{6932FB68-BE35-3BD4-331F-8B3E47538372}"/>
               </a:ext>
             </a:extLst>
           </p:cNvPr>
@@ -13941,7 +14198,7 @@
             <a:spLocks noGrp="1"/>
           </p:cNvSpPr>
           <p:nvPr>
-            <p:ph type="subTitle" idx="1"/>
+            <p:ph idx="1"/>
           </p:nvPr>
         </p:nvSpPr>
         <p:spPr/>
@@ -13956,7 +14213,7 @@
     </p:spTree>
     <p:extLst>
       <p:ext uri="{BB962C8B-B14F-4D97-AF65-F5344CB8AC3E}">
-        <p14:creationId xmlns:p14="http://schemas.microsoft.com/office/powerpoint/2010/main" val="825206913"/>
+        <p14:creationId xmlns:p14="http://schemas.microsoft.com/office/powerpoint/2010/main" val="2738676832"/>
       </p:ext>
     </p:extLst>
   </p:cSld>
@@ -13966,7 +14223,7 @@
 </p:sld>
 </file>
 
-<file path=ppt/slides/slide2.xml><?xml version="1.0" encoding="utf-8"?>
+<file path=ppt/slides/slide3.xml><?xml version="1.0" encoding="utf-8"?>
 <p:sld xmlns:a="http://schemas.openxmlformats.org/drawingml/2006/main" xmlns:r="http://schemas.openxmlformats.org/officeDocument/2006/relationships" xmlns:p="http://schemas.openxmlformats.org/presentationml/2006/main">
   <p:cSld>
     <p:spTree>
@@ -13999,7 +14256,7 @@
             <p:ph idx="1"/>
             <p:extLst>
               <p:ext uri="{D42A27DB-BD31-4B8C-83A1-F6EECF244321}">
-                <p14:modId xmlns:p14="http://schemas.microsoft.com/office/powerpoint/2010/main" val="1228947898"/>
+                <p14:modId xmlns:p14="http://schemas.microsoft.com/office/powerpoint/2010/main" val="2022848234"/>
               </p:ext>
             </p:extLst>
           </p:nvPr>
@@ -14027,7 +14284,7 @@
 </p:sld>
 </file>
 
-<file path=ppt/slides/slide3.xml><?xml version="1.0" encoding="utf-8"?>
+<file path=ppt/slides/slide4.xml><?xml version="1.0" encoding="utf-8"?>
 <p:sld xmlns:a="http://schemas.openxmlformats.org/drawingml/2006/main" xmlns:r="http://schemas.openxmlformats.org/officeDocument/2006/relationships" xmlns:p="http://schemas.openxmlformats.org/presentationml/2006/main">
   <p:cSld>
     <p:spTree>
@@ -14050,37 +14307,6 @@
           <a:chExt cx="0" cy="0"/>
         </a:xfrm>
       </p:grpSpPr>
-      <p:graphicFrame>
-        <p:nvGraphicFramePr>
-          <p:cNvPr id="6" name="Content Placeholder 5">
-            <a:extLst>
-              <a:ext uri="{FF2B5EF4-FFF2-40B4-BE49-F238E27FC236}">
-                <a16:creationId xmlns:a16="http://schemas.microsoft.com/office/drawing/2014/main" id="{23242F32-DEBD-4356-BC87-B23C4AEAE578}"/>
-              </a:ext>
-            </a:extLst>
-          </p:cNvPr>
-          <p:cNvGraphicFramePr>
-            <a:graphicFrameLocks noGrp="1"/>
-          </p:cNvGraphicFramePr>
-          <p:nvPr>
-            <p:ph idx="1"/>
-            <p:extLst>
-              <p:ext uri="{D42A27DB-BD31-4B8C-83A1-F6EECF244321}">
-                <p14:modId xmlns:p14="http://schemas.microsoft.com/office/powerpoint/2010/main" val="1535567137"/>
-              </p:ext>
-            </p:extLst>
-          </p:nvPr>
-        </p:nvGraphicFramePr>
-        <p:xfrm>
-          <a:off x="402100" y="243324"/>
-          <a:ext cx="8560473" cy="5582603"/>
-        </p:xfrm>
-        <a:graphic>
-          <a:graphicData uri="http://schemas.openxmlformats.org/drawingml/2006/diagram">
-            <dgm:relIds xmlns:dgm="http://schemas.openxmlformats.org/drawingml/2006/diagram" xmlns:r="http://schemas.openxmlformats.org/officeDocument/2006/relationships" r:dm="rId2" r:lo="rId3" r:qs="rId4" r:cs="rId5"/>
-          </a:graphicData>
-        </a:graphic>
-      </p:graphicFrame>
       <p:pic>
         <p:nvPicPr>
           <p:cNvPr id="3" name="Picture 2" descr="A shadow of a black object on a white surface&#10;&#10;Description automatically generated">
@@ -14096,7 +14322,7 @@
           <p:nvPr/>
         </p:nvPicPr>
         <p:blipFill rotWithShape="1">
-          <a:blip r:embed="rId7">
+          <a:blip r:embed="rId2">
             <a:extLst>
               <a:ext uri="{28A0092B-C50C-407E-A947-70E740481C1C}">
                 <a14:useLocalDpi xmlns:a14="http://schemas.microsoft.com/office/drawing/2010/main" val="0"/>
@@ -14108,8 +14334,8 @@
         </p:blipFill>
         <p:spPr>
           <a:xfrm>
-            <a:off x="9075863" y="193517"/>
-            <a:ext cx="1359631" cy="1281351"/>
+            <a:off x="9049030" y="173048"/>
+            <a:ext cx="1421838" cy="1339976"/>
           </a:xfrm>
           <a:prstGeom prst="rect">
             <a:avLst/>
@@ -14131,7 +14357,7 @@
           <p:nvPr/>
         </p:nvPicPr>
         <p:blipFill rotWithShape="1">
-          <a:blip r:embed="rId8">
+          <a:blip r:embed="rId3">
             <a:extLst>
               <a:ext uri="{28A0092B-C50C-407E-A947-70E740481C1C}">
                 <a14:useLocalDpi xmlns:a14="http://schemas.microsoft.com/office/drawing/2010/main" val="0"/>
@@ -14143,8 +14369,75 @@
         </p:blipFill>
         <p:spPr>
           <a:xfrm>
-            <a:off x="9136487" y="1657433"/>
-            <a:ext cx="1254234" cy="1221475"/>
+            <a:off x="9054600" y="1635601"/>
+            <a:ext cx="1421838" cy="1384701"/>
+          </a:xfrm>
+          <a:prstGeom prst="rect">
+            <a:avLst/>
+          </a:prstGeom>
+        </p:spPr>
+      </p:pic>
+      <p:graphicFrame>
+        <p:nvGraphicFramePr>
+          <p:cNvPr id="7" name="Content Placeholder 5">
+            <a:extLst>
+              <a:ext uri="{FF2B5EF4-FFF2-40B4-BE49-F238E27FC236}">
+                <a16:creationId xmlns:a16="http://schemas.microsoft.com/office/drawing/2014/main" id="{D0629F9E-3330-F221-6FDA-84ED38F6F8A5}"/>
+              </a:ext>
+            </a:extLst>
+          </p:cNvPr>
+          <p:cNvGraphicFramePr>
+            <a:graphicFrameLocks noGrp="1"/>
+          </p:cNvGraphicFramePr>
+          <p:nvPr>
+            <p:ph idx="1"/>
+            <p:extLst>
+              <p:ext uri="{D42A27DB-BD31-4B8C-83A1-F6EECF244321}">
+                <p14:modId xmlns:p14="http://schemas.microsoft.com/office/powerpoint/2010/main" val="1578976405"/>
+              </p:ext>
+            </p:extLst>
+          </p:nvPr>
+        </p:nvGraphicFramePr>
+        <p:xfrm>
+          <a:off x="128515" y="300251"/>
+          <a:ext cx="8885141" cy="5431809"/>
+        </p:xfrm>
+        <a:graphic>
+          <a:graphicData uri="http://schemas.openxmlformats.org/drawingml/2006/diagram">
+            <dgm:relIds xmlns:dgm="http://schemas.openxmlformats.org/drawingml/2006/diagram" xmlns:r="http://schemas.openxmlformats.org/officeDocument/2006/relationships" r:dm="rId4" r:lo="rId5" r:qs="rId6" r:cs="rId7"/>
+          </a:graphicData>
+        </a:graphic>
+      </p:graphicFrame>
+      <p:pic>
+        <p:nvPicPr>
+          <p:cNvPr id="11" name="Picture 10" descr="A white sharp tip of a knife&#10;&#10;Description automatically generated">
+            <a:extLst>
+              <a:ext uri="{FF2B5EF4-FFF2-40B4-BE49-F238E27FC236}">
+                <a16:creationId xmlns:a16="http://schemas.microsoft.com/office/drawing/2014/main" id="{EA5C4FC5-9634-EA7B-1028-0869927EF44D}"/>
+              </a:ext>
+            </a:extLst>
+          </p:cNvPr>
+          <p:cNvPicPr>
+            <a:picLocks noChangeAspect="1"/>
+          </p:cNvPicPr>
+          <p:nvPr/>
+        </p:nvPicPr>
+        <p:blipFill>
+          <a:blip r:embed="rId9">
+            <a:extLst>
+              <a:ext uri="{28A0092B-C50C-407E-A947-70E740481C1C}">
+                <a14:useLocalDpi xmlns:a14="http://schemas.microsoft.com/office/drawing/2010/main" val="0"/>
+              </a:ext>
+            </a:extLst>
+          </a:blip>
+          <a:stretch>
+            <a:fillRect/>
+          </a:stretch>
+        </p:blipFill>
+        <p:spPr>
+          <a:xfrm>
+            <a:off x="10677485" y="1630155"/>
+            <a:ext cx="1386000" cy="1386000"/>
           </a:xfrm>
           <a:prstGeom prst="rect">
             <a:avLst/>
@@ -14153,10 +14446,10 @@
       </p:pic>
       <p:pic>
         <p:nvPicPr>
-          <p:cNvPr id="8" name="Picture 7" descr="A grey and black background&#10;&#10;Description automatically generated with medium confidence">
+          <p:cNvPr id="15" name="Picture 14" descr="A white triangle on a black background&#10;&#10;Description automatically generated">
             <a:extLst>
               <a:ext uri="{FF2B5EF4-FFF2-40B4-BE49-F238E27FC236}">
-                <a16:creationId xmlns:a16="http://schemas.microsoft.com/office/drawing/2014/main" id="{4F169EBE-68DA-FE9F-FE96-45D47EC5A791}"/>
+                <a16:creationId xmlns:a16="http://schemas.microsoft.com/office/drawing/2014/main" id="{AC2F1E61-8F26-940F-C0E0-2A57D687E0EC}"/>
               </a:ext>
             </a:extLst>
           </p:cNvPr>
@@ -14165,21 +14458,22 @@
           </p:cNvPicPr>
           <p:nvPr/>
         </p:nvPicPr>
-        <p:blipFill rotWithShape="1">
-          <a:blip r:embed="rId9">
+        <p:blipFill>
+          <a:blip r:embed="rId10">
             <a:extLst>
               <a:ext uri="{28A0092B-C50C-407E-A947-70E740481C1C}">
                 <a14:useLocalDpi xmlns:a14="http://schemas.microsoft.com/office/drawing/2010/main" val="0"/>
               </a:ext>
             </a:extLst>
           </a:blip>
-          <a:srcRect t="27035"/>
-          <a:stretch/>
+          <a:stretch>
+            <a:fillRect/>
+          </a:stretch>
         </p:blipFill>
         <p:spPr>
           <a:xfrm>
-            <a:off x="9097892" y="3244038"/>
-            <a:ext cx="1254234" cy="1221475"/>
+            <a:off x="9049030" y="3234165"/>
+            <a:ext cx="1386000" cy="1386000"/>
           </a:xfrm>
           <a:prstGeom prst="rect">
             <a:avLst/>
@@ -14188,10 +14482,10 @@
       </p:pic>
       <p:pic>
         <p:nvPicPr>
-          <p:cNvPr id="10" name="Picture 9" descr="A light shining through a wall&#10;&#10;Description automatically generated">
+          <p:cNvPr id="17" name="Picture 16" descr="A close up of a person's eye&#10;&#10;Description automatically generated">
             <a:extLst>
               <a:ext uri="{FF2B5EF4-FFF2-40B4-BE49-F238E27FC236}">
-                <a16:creationId xmlns:a16="http://schemas.microsoft.com/office/drawing/2014/main" id="{809CA349-095A-FF04-7534-447309EAF863}"/>
+                <a16:creationId xmlns:a16="http://schemas.microsoft.com/office/drawing/2014/main" id="{58A95FF5-87B5-F50D-CA19-4088E2A2D3FF}"/>
               </a:ext>
             </a:extLst>
           </p:cNvPr>
@@ -14200,21 +14494,22 @@
           </p:cNvPicPr>
           <p:nvPr/>
         </p:nvPicPr>
-        <p:blipFill rotWithShape="1">
-          <a:blip r:embed="rId10">
+        <p:blipFill>
+          <a:blip r:embed="rId11">
             <a:extLst>
               <a:ext uri="{28A0092B-C50C-407E-A947-70E740481C1C}">
                 <a14:useLocalDpi xmlns:a14="http://schemas.microsoft.com/office/drawing/2010/main" val="0"/>
               </a:ext>
             </a:extLst>
           </a:blip>
-          <a:srcRect t="29941"/>
-          <a:stretch/>
+          <a:stretch>
+            <a:fillRect/>
+          </a:stretch>
         </p:blipFill>
         <p:spPr>
           <a:xfrm>
-            <a:off x="9020550" y="4741443"/>
-            <a:ext cx="1486108" cy="1389658"/>
+            <a:off x="10677485" y="5472000"/>
+            <a:ext cx="1386000" cy="1386000"/>
           </a:xfrm>
           <a:prstGeom prst="rect">
             <a:avLst/>
@@ -14223,10 +14518,10 @@
       </p:pic>
       <p:pic>
         <p:nvPicPr>
-          <p:cNvPr id="12" name="Picture 11" descr="A close-up of a sharp point&#10;&#10;Description automatically generated">
+          <p:cNvPr id="19" name="Picture 18" descr="A close up of a blue eye&#10;&#10;Description automatically generated">
             <a:extLst>
               <a:ext uri="{FF2B5EF4-FFF2-40B4-BE49-F238E27FC236}">
-                <a16:creationId xmlns:a16="http://schemas.microsoft.com/office/drawing/2014/main" id="{204E79BA-F150-3659-5FB2-B30347934546}"/>
+                <a16:creationId xmlns:a16="http://schemas.microsoft.com/office/drawing/2014/main" id="{FFFD9D49-FD71-029C-D4AE-7EDE92EAB0D5}"/>
               </a:ext>
             </a:extLst>
           </p:cNvPr>
@@ -14235,21 +14530,22 @@
           </p:cNvPicPr>
           <p:nvPr/>
         </p:nvPicPr>
-        <p:blipFill rotWithShape="1">
-          <a:blip r:embed="rId11">
+        <p:blipFill>
+          <a:blip r:embed="rId12">
             <a:extLst>
               <a:ext uri="{28A0092B-C50C-407E-A947-70E740481C1C}">
                 <a14:useLocalDpi xmlns:a14="http://schemas.microsoft.com/office/drawing/2010/main" val="0"/>
               </a:ext>
             </a:extLst>
           </a:blip>
-          <a:srcRect t="33982"/>
-          <a:stretch/>
+          <a:stretch>
+            <a:fillRect/>
+          </a:stretch>
         </p:blipFill>
         <p:spPr>
           <a:xfrm>
-            <a:off x="10564635" y="5476352"/>
-            <a:ext cx="1567990" cy="1381647"/>
+            <a:off x="10677485" y="4086000"/>
+            <a:ext cx="1386000" cy="1386000"/>
           </a:xfrm>
           <a:prstGeom prst="rect">
             <a:avLst/>
@@ -14258,10 +14554,10 @@
       </p:pic>
       <p:pic>
         <p:nvPicPr>
-          <p:cNvPr id="14" name="Picture 13" descr="A close-up of a knife&#10;&#10;Description automatically generated">
+          <p:cNvPr id="21" name="Picture 20" descr="A light shining on a wall&#10;&#10;Description automatically generated">
             <a:extLst>
               <a:ext uri="{FF2B5EF4-FFF2-40B4-BE49-F238E27FC236}">
-                <a16:creationId xmlns:a16="http://schemas.microsoft.com/office/drawing/2014/main" id="{D7A48418-2F2D-69CF-0CCA-3CD3938151EE}"/>
+                <a16:creationId xmlns:a16="http://schemas.microsoft.com/office/drawing/2014/main" id="{DB8DEC0D-BD10-2A3F-E59F-46E98F4C1137}"/>
               </a:ext>
             </a:extLst>
           </p:cNvPr>
@@ -14270,21 +14566,22 @@
           </p:cNvPicPr>
           <p:nvPr/>
         </p:nvPicPr>
-        <p:blipFill rotWithShape="1">
-          <a:blip r:embed="rId12">
+        <p:blipFill>
+          <a:blip r:embed="rId13">
             <a:extLst>
               <a:ext uri="{28A0092B-C50C-407E-A947-70E740481C1C}">
                 <a14:useLocalDpi xmlns:a14="http://schemas.microsoft.com/office/drawing/2010/main" val="0"/>
               </a:ext>
             </a:extLst>
           </a:blip>
-          <a:srcRect t="33982"/>
-          <a:stretch/>
+          <a:stretch>
+            <a:fillRect/>
+          </a:stretch>
         </p:blipFill>
         <p:spPr>
           <a:xfrm>
-            <a:off x="10548785" y="4044946"/>
-            <a:ext cx="1580867" cy="1392994"/>
+            <a:off x="9049030" y="5039060"/>
+            <a:ext cx="1386000" cy="1386000"/>
           </a:xfrm>
           <a:prstGeom prst="rect">
             <a:avLst/>
@@ -14304,7 +14601,7 @@
 </p:sld>
 </file>
 
-<file path=ppt/slides/slide4.xml><?xml version="1.0" encoding="utf-8"?>
+<file path=ppt/slides/slide5.xml><?xml version="1.0" encoding="utf-8"?>
 <p:sld xmlns:a="http://schemas.openxmlformats.org/drawingml/2006/main" xmlns:r="http://schemas.openxmlformats.org/officeDocument/2006/relationships" xmlns:p="http://schemas.openxmlformats.org/presentationml/2006/main">
   <p:cSld>
     <p:spTree>
@@ -14362,6 +14659,86 @@
     <p:extLst>
       <p:ext uri="{BB962C8B-B14F-4D97-AF65-F5344CB8AC3E}">
         <p14:creationId xmlns:p14="http://schemas.microsoft.com/office/powerpoint/2010/main" val="1869597177"/>
+      </p:ext>
+    </p:extLst>
+  </p:cSld>
+  <p:clrMapOvr>
+    <a:masterClrMapping/>
+  </p:clrMapOvr>
+</p:sld>
+</file>
+
+<file path=ppt/slides/slide6.xml><?xml version="1.0" encoding="utf-8"?>
+<p:sld xmlns:a="http://schemas.openxmlformats.org/drawingml/2006/main" xmlns:r="http://schemas.openxmlformats.org/officeDocument/2006/relationships" xmlns:p="http://schemas.openxmlformats.org/presentationml/2006/main">
+  <p:cSld>
+    <p:spTree>
+      <p:nvGrpSpPr>
+        <p:cNvPr id="1" name=""/>
+        <p:cNvGrpSpPr/>
+        <p:nvPr/>
+      </p:nvGrpSpPr>
+      <p:grpSpPr>
+        <a:xfrm>
+          <a:off x="0" y="0"/>
+          <a:ext cx="0" cy="0"/>
+          <a:chOff x="0" y="0"/>
+          <a:chExt cx="0" cy="0"/>
+        </a:xfrm>
+      </p:grpSpPr>
+      <p:sp>
+        <p:nvSpPr>
+          <p:cNvPr id="10" name="Content Placeholder 9">
+            <a:extLst>
+              <a:ext uri="{FF2B5EF4-FFF2-40B4-BE49-F238E27FC236}">
+                <a16:creationId xmlns:a16="http://schemas.microsoft.com/office/drawing/2014/main" id="{DE23F39D-E7B7-29F5-EA5E-1C210A43C21B}"/>
+              </a:ext>
+            </a:extLst>
+          </p:cNvPr>
+          <p:cNvSpPr>
+            <a:spLocks noGrp="1"/>
+          </p:cNvSpPr>
+          <p:nvPr>
+            <p:ph sz="half" idx="1"/>
+          </p:nvPr>
+        </p:nvSpPr>
+        <p:spPr/>
+        <p:txBody>
+          <a:bodyPr/>
+          <a:lstStyle/>
+          <a:p>
+            <a:endParaRPr lang="en-US"/>
+          </a:p>
+        </p:txBody>
+      </p:sp>
+      <p:sp>
+        <p:nvSpPr>
+          <p:cNvPr id="12" name="Content Placeholder 11">
+            <a:extLst>
+              <a:ext uri="{FF2B5EF4-FFF2-40B4-BE49-F238E27FC236}">
+                <a16:creationId xmlns:a16="http://schemas.microsoft.com/office/drawing/2014/main" id="{28F6FDA2-32F6-A59E-4E9F-738E6CDE54DD}"/>
+              </a:ext>
+            </a:extLst>
+          </p:cNvPr>
+          <p:cNvSpPr>
+            <a:spLocks noGrp="1"/>
+          </p:cNvSpPr>
+          <p:nvPr>
+            <p:ph sz="half" idx="2"/>
+          </p:nvPr>
+        </p:nvSpPr>
+        <p:spPr/>
+        <p:txBody>
+          <a:bodyPr/>
+          <a:lstStyle/>
+          <a:p>
+            <a:endParaRPr lang="en-US"/>
+          </a:p>
+        </p:txBody>
+      </p:sp>
+    </p:spTree>
+    <p:extLst>
+      <p:ext uri="{BB962C8B-B14F-4D97-AF65-F5344CB8AC3E}">
+        <p14:creationId xmlns:p14="http://schemas.microsoft.com/office/powerpoint/2010/main" val="4135701940"/>
       </p:ext>
     </p:extLst>
   </p:cSld>

</xml_diff>